<commit_message>
Fix icon mis position
</commit_message>
<xml_diff>
--- a/_images/icon.pptx
+++ b/_images/icon.pptx
@@ -244,7 +244,7 @@
           <a:p>
             <a:fld id="{4609EE04-BCB7-E443-B242-D760F4F53974}" type="datetimeFigureOut">
               <a:rPr lang="en-US" smtClean="0"/>
-              <a:t>3/29/16</a:t>
+              <a:t>4/1/16</a:t>
             </a:fld>
             <a:endParaRPr lang="en-US"/>
           </a:p>
@@ -414,7 +414,7 @@
           <a:p>
             <a:fld id="{4609EE04-BCB7-E443-B242-D760F4F53974}" type="datetimeFigureOut">
               <a:rPr lang="en-US" smtClean="0"/>
-              <a:t>3/29/16</a:t>
+              <a:t>4/1/16</a:t>
             </a:fld>
             <a:endParaRPr lang="en-US"/>
           </a:p>
@@ -594,7 +594,7 @@
           <a:p>
             <a:fld id="{4609EE04-BCB7-E443-B242-D760F4F53974}" type="datetimeFigureOut">
               <a:rPr lang="en-US" smtClean="0"/>
-              <a:t>3/29/16</a:t>
+              <a:t>4/1/16</a:t>
             </a:fld>
             <a:endParaRPr lang="en-US"/>
           </a:p>
@@ -764,7 +764,7 @@
           <a:p>
             <a:fld id="{4609EE04-BCB7-E443-B242-D760F4F53974}" type="datetimeFigureOut">
               <a:rPr lang="en-US" smtClean="0"/>
-              <a:t>3/29/16</a:t>
+              <a:t>4/1/16</a:t>
             </a:fld>
             <a:endParaRPr lang="en-US"/>
           </a:p>
@@ -1008,7 +1008,7 @@
           <a:p>
             <a:fld id="{4609EE04-BCB7-E443-B242-D760F4F53974}" type="datetimeFigureOut">
               <a:rPr lang="en-US" smtClean="0"/>
-              <a:t>3/29/16</a:t>
+              <a:t>4/1/16</a:t>
             </a:fld>
             <a:endParaRPr lang="en-US"/>
           </a:p>
@@ -1240,7 +1240,7 @@
           <a:p>
             <a:fld id="{4609EE04-BCB7-E443-B242-D760F4F53974}" type="datetimeFigureOut">
               <a:rPr lang="en-US" smtClean="0"/>
-              <a:t>3/29/16</a:t>
+              <a:t>4/1/16</a:t>
             </a:fld>
             <a:endParaRPr lang="en-US"/>
           </a:p>
@@ -1607,7 +1607,7 @@
           <a:p>
             <a:fld id="{4609EE04-BCB7-E443-B242-D760F4F53974}" type="datetimeFigureOut">
               <a:rPr lang="en-US" smtClean="0"/>
-              <a:t>3/29/16</a:t>
+              <a:t>4/1/16</a:t>
             </a:fld>
             <a:endParaRPr lang="en-US"/>
           </a:p>
@@ -1725,7 +1725,7 @@
           <a:p>
             <a:fld id="{4609EE04-BCB7-E443-B242-D760F4F53974}" type="datetimeFigureOut">
               <a:rPr lang="en-US" smtClean="0"/>
-              <a:t>3/29/16</a:t>
+              <a:t>4/1/16</a:t>
             </a:fld>
             <a:endParaRPr lang="en-US"/>
           </a:p>
@@ -1820,7 +1820,7 @@
           <a:p>
             <a:fld id="{4609EE04-BCB7-E443-B242-D760F4F53974}" type="datetimeFigureOut">
               <a:rPr lang="en-US" smtClean="0"/>
-              <a:t>3/29/16</a:t>
+              <a:t>4/1/16</a:t>
             </a:fld>
             <a:endParaRPr lang="en-US"/>
           </a:p>
@@ -2097,7 +2097,7 @@
           <a:p>
             <a:fld id="{4609EE04-BCB7-E443-B242-D760F4F53974}" type="datetimeFigureOut">
               <a:rPr lang="en-US" smtClean="0"/>
-              <a:t>3/29/16</a:t>
+              <a:t>4/1/16</a:t>
             </a:fld>
             <a:endParaRPr lang="en-US"/>
           </a:p>
@@ -2354,7 +2354,7 @@
           <a:p>
             <a:fld id="{4609EE04-BCB7-E443-B242-D760F4F53974}" type="datetimeFigureOut">
               <a:rPr lang="en-US" smtClean="0"/>
-              <a:t>3/29/16</a:t>
+              <a:t>4/1/16</a:t>
             </a:fld>
             <a:endParaRPr lang="en-US"/>
           </a:p>
@@ -2567,7 +2567,7 @@
           <a:p>
             <a:fld id="{4609EE04-BCB7-E443-B242-D760F4F53974}" type="datetimeFigureOut">
               <a:rPr lang="en-US" smtClean="0"/>
-              <a:t>3/29/16</a:t>
+              <a:t>4/1/16</a:t>
             </a:fld>
             <a:endParaRPr lang="en-US"/>
           </a:p>
@@ -2981,9 +2981,9 @@
         <p:grpSpPr>
           <a:xfrm>
             <a:off x="5173600" y="786007"/>
-            <a:ext cx="3483061" cy="4619569"/>
+            <a:ext cx="3483061" cy="4613091"/>
             <a:chOff x="5173600" y="786007"/>
-            <a:chExt cx="3483061" cy="4619569"/>
+            <a:chExt cx="3483061" cy="4613091"/>
           </a:xfrm>
         </p:grpSpPr>
         <p:sp>
@@ -3098,7 +3098,7 @@
           </p:nvCxnSpPr>
           <p:spPr>
             <a:xfrm>
-              <a:off x="5219109" y="1726176"/>
+              <a:off x="5212928" y="1719698"/>
               <a:ext cx="0" cy="3679400"/>
             </a:xfrm>
             <a:prstGeom prst="line">
@@ -3168,8 +3168,8 @@
           </p:nvSpPr>
           <p:spPr>
             <a:xfrm>
-              <a:off x="5192364" y="2678231"/>
-              <a:ext cx="3464296" cy="1022593"/>
+              <a:off x="5173600" y="2678231"/>
+              <a:ext cx="3483060" cy="1022593"/>
             </a:xfrm>
             <a:prstGeom prst="frame">
               <a:avLst>
@@ -3989,8 +3989,8 @@
         </p:nvSpPr>
         <p:spPr>
           <a:xfrm>
-            <a:off x="5219107" y="2669881"/>
-            <a:ext cx="3483060" cy="1022593"/>
+            <a:off x="5220490" y="2669881"/>
+            <a:ext cx="3483061" cy="1022593"/>
           </a:xfrm>
           <a:prstGeom prst="frame">
             <a:avLst>
@@ -4056,9 +4056,9 @@
           <p:grpSpPr>
             <a:xfrm>
               <a:off x="5064367" y="1126876"/>
-              <a:ext cx="3166419" cy="4199608"/>
+              <a:ext cx="3166419" cy="4215449"/>
               <a:chOff x="4853353" y="1361338"/>
-              <a:chExt cx="3701630" cy="4199608"/>
+              <a:chExt cx="3701630" cy="4215449"/>
             </a:xfrm>
             <a:solidFill>
               <a:schemeClr val="bg1"/>
@@ -4172,7 +4172,7 @@
             </p:nvCxnSpPr>
             <p:spPr>
               <a:xfrm>
-                <a:off x="4901718" y="2216037"/>
+                <a:off x="4890801" y="2231878"/>
                 <a:ext cx="0" cy="3344909"/>
               </a:xfrm>
               <a:prstGeom prst="line">

</xml_diff>